<commit_message>
added figures from exams and exercises
</commit_message>
<xml_diff>
--- a/assets/figures/fig-active-inference-model-specification.pptx
+++ b/assets/figures/fig-active-inference-model-specification.pptx
@@ -226,7 +226,7 @@
           <a:p>
             <a:fld id="{B2DAE26E-1A3C-384E-9015-34D0DF8AD49D}" type="datetimeFigureOut">
               <a:rPr lang="en-US" smtClean="0"/>
-              <a:t>8/29/22</a:t>
+              <a:t>8/30/2019</a:t>
             </a:fld>
             <a:endParaRPr lang="en-US"/>
           </a:p>
@@ -403,7 +403,7 @@
           <a:p>
             <a:fld id="{B517BF2B-D9C8-2B42-A233-4F07BCF3CC92}" type="datetimeFigureOut">
               <a:rPr lang="en-US" smtClean="0"/>
-              <a:t>8/29/22</a:t>
+              <a:t>8/30/2019</a:t>
             </a:fld>
             <a:endParaRPr lang="en-US"/>
           </a:p>
@@ -885,7 +885,7 @@
           <a:p>
             <a:fld id="{A8460AB8-2B37-E04B-8444-4CEC5A158CAC}" type="datetimeFigureOut">
               <a:rPr lang="en-US" smtClean="0"/>
-              <a:t>8/29/22</a:t>
+              <a:t>8/30/2019</a:t>
             </a:fld>
             <a:endParaRPr lang="en-US"/>
           </a:p>
@@ -1055,7 +1055,7 @@
           <a:p>
             <a:fld id="{A8460AB8-2B37-E04B-8444-4CEC5A158CAC}" type="datetimeFigureOut">
               <a:rPr lang="en-US" smtClean="0"/>
-              <a:t>8/29/22</a:t>
+              <a:t>8/30/2019</a:t>
             </a:fld>
             <a:endParaRPr lang="en-US"/>
           </a:p>
@@ -1235,7 +1235,7 @@
           <a:p>
             <a:fld id="{A8460AB8-2B37-E04B-8444-4CEC5A158CAC}" type="datetimeFigureOut">
               <a:rPr lang="en-US" smtClean="0"/>
-              <a:t>8/29/22</a:t>
+              <a:t>8/30/2019</a:t>
             </a:fld>
             <a:endParaRPr lang="en-US"/>
           </a:p>
@@ -1405,7 +1405,7 @@
           <a:p>
             <a:fld id="{A8460AB8-2B37-E04B-8444-4CEC5A158CAC}" type="datetimeFigureOut">
               <a:rPr lang="en-US" smtClean="0"/>
-              <a:t>8/29/22</a:t>
+              <a:t>8/30/2019</a:t>
             </a:fld>
             <a:endParaRPr lang="en-US"/>
           </a:p>
@@ -1649,7 +1649,7 @@
           <a:p>
             <a:fld id="{A8460AB8-2B37-E04B-8444-4CEC5A158CAC}" type="datetimeFigureOut">
               <a:rPr lang="en-US" smtClean="0"/>
-              <a:t>8/29/22</a:t>
+              <a:t>8/30/2019</a:t>
             </a:fld>
             <a:endParaRPr lang="en-US"/>
           </a:p>
@@ -1881,7 +1881,7 @@
           <a:p>
             <a:fld id="{A8460AB8-2B37-E04B-8444-4CEC5A158CAC}" type="datetimeFigureOut">
               <a:rPr lang="en-US" smtClean="0"/>
-              <a:t>8/29/22</a:t>
+              <a:t>8/30/2019</a:t>
             </a:fld>
             <a:endParaRPr lang="en-US"/>
           </a:p>
@@ -2248,7 +2248,7 @@
           <a:p>
             <a:fld id="{A8460AB8-2B37-E04B-8444-4CEC5A158CAC}" type="datetimeFigureOut">
               <a:rPr lang="en-US" smtClean="0"/>
-              <a:t>8/29/22</a:t>
+              <a:t>8/30/2019</a:t>
             </a:fld>
             <a:endParaRPr lang="en-US"/>
           </a:p>
@@ -2366,7 +2366,7 @@
           <a:p>
             <a:fld id="{A8460AB8-2B37-E04B-8444-4CEC5A158CAC}" type="datetimeFigureOut">
               <a:rPr lang="en-US" smtClean="0"/>
-              <a:t>8/29/22</a:t>
+              <a:t>8/30/2019</a:t>
             </a:fld>
             <a:endParaRPr lang="en-US"/>
           </a:p>
@@ -2723,7 +2723,7 @@
           <a:p>
             <a:fld id="{A8460AB8-2B37-E04B-8444-4CEC5A158CAC}" type="datetimeFigureOut">
               <a:rPr lang="en-US" smtClean="0"/>
-              <a:t>8/29/22</a:t>
+              <a:t>8/30/2019</a:t>
             </a:fld>
             <a:endParaRPr lang="en-US"/>
           </a:p>
@@ -2980,7 +2980,7 @@
           <a:p>
             <a:fld id="{A8460AB8-2B37-E04B-8444-4CEC5A158CAC}" type="datetimeFigureOut">
               <a:rPr lang="en-US" smtClean="0"/>
-              <a:t>8/29/22</a:t>
+              <a:t>8/30/2019</a:t>
             </a:fld>
             <a:endParaRPr lang="en-US"/>
           </a:p>
@@ -3193,7 +3193,7 @@
           <a:p>
             <a:fld id="{A8460AB8-2B37-E04B-8444-4CEC5A158CAC}" type="datetimeFigureOut">
               <a:rPr lang="en-US" smtClean="0"/>
-              <a:t>8/29/22</a:t>
+              <a:t>8/30/2019</a:t>
             </a:fld>
             <a:endParaRPr lang="en-US"/>
           </a:p>
@@ -5519,8 +5519,8 @@
               </a:p>
             </p:txBody>
           </p:sp>
-          <mc:AlternateContent xmlns:mc="http://schemas.openxmlformats.org/markup-compatibility/2006" xmlns:a14="http://schemas.microsoft.com/office/drawing/2010/main">
-            <mc:Choice Requires="a14">
+          <mc:AlternateContent xmlns:mc="http://schemas.openxmlformats.org/markup-compatibility/2006">
+            <mc:Choice xmlns:a14="http://schemas.microsoft.com/office/drawing/2010/main" Requires="a14">
               <p:sp>
                 <p:nvSpPr>
                   <p:cNvPr id="178" name="TextBox 177">
@@ -5589,7 +5589,7 @@
                 </p:txBody>
               </p:sp>
             </mc:Choice>
-            <mc:Fallback xmlns="">
+            <mc:Fallback>
               <p:sp>
                 <p:nvSpPr>
                   <p:cNvPr id="178" name="TextBox 177">
@@ -5781,8 +5781,8 @@
             </a:p>
           </p:txBody>
         </p:sp>
-        <mc:AlternateContent xmlns:mc="http://schemas.openxmlformats.org/markup-compatibility/2006" xmlns:a14="http://schemas.microsoft.com/office/drawing/2010/main">
-          <mc:Choice Requires="a14">
+        <mc:AlternateContent xmlns:mc="http://schemas.openxmlformats.org/markup-compatibility/2006">
+          <mc:Choice xmlns:a14="http://schemas.microsoft.com/office/drawing/2010/main" Requires="a14">
             <p:sp>
               <p:nvSpPr>
                 <p:cNvPr id="203" name="TextBox 202">
@@ -5857,7 +5857,7 @@
               </p:txBody>
             </p:sp>
           </mc:Choice>
-          <mc:Fallback xmlns="">
+          <mc:Fallback>
             <p:sp>
               <p:nvSpPr>
                 <p:cNvPr id="203" name="TextBox 202">
@@ -5902,8 +5902,8 @@
             </p:sp>
           </mc:Fallback>
         </mc:AlternateContent>
-        <mc:AlternateContent xmlns:mc="http://schemas.openxmlformats.org/markup-compatibility/2006" xmlns:a14="http://schemas.microsoft.com/office/drawing/2010/main">
-          <mc:Choice Requires="a14">
+        <mc:AlternateContent xmlns:mc="http://schemas.openxmlformats.org/markup-compatibility/2006">
+          <mc:Choice xmlns:a14="http://schemas.microsoft.com/office/drawing/2010/main" Requires="a14">
             <p:sp>
               <p:nvSpPr>
                 <p:cNvPr id="204" name="TextBox 203">
@@ -5972,7 +5972,7 @@
               </p:txBody>
             </p:sp>
           </mc:Choice>
-          <mc:Fallback xmlns="">
+          <mc:Fallback>
             <p:sp>
               <p:nvSpPr>
                 <p:cNvPr id="204" name="TextBox 203">
@@ -6017,8 +6017,8 @@
             </p:sp>
           </mc:Fallback>
         </mc:AlternateContent>
-        <mc:AlternateContent xmlns:mc="http://schemas.openxmlformats.org/markup-compatibility/2006" xmlns:a14="http://schemas.microsoft.com/office/drawing/2010/main">
-          <mc:Choice Requires="a14">
+        <mc:AlternateContent xmlns:mc="http://schemas.openxmlformats.org/markup-compatibility/2006">
+          <mc:Choice xmlns:a14="http://schemas.microsoft.com/office/drawing/2010/main" Requires="a14">
             <p:sp>
               <p:nvSpPr>
                 <p:cNvPr id="205" name="TextBox 204">
@@ -6093,7 +6093,7 @@
               </p:txBody>
             </p:sp>
           </mc:Choice>
-          <mc:Fallback xmlns="">
+          <mc:Fallback>
             <p:sp>
               <p:nvSpPr>
                 <p:cNvPr id="205" name="TextBox 204">
@@ -6138,8 +6138,8 @@
             </p:sp>
           </mc:Fallback>
         </mc:AlternateContent>
-        <mc:AlternateContent xmlns:mc="http://schemas.openxmlformats.org/markup-compatibility/2006" xmlns:a14="http://schemas.microsoft.com/office/drawing/2010/main">
-          <mc:Choice Requires="a14">
+        <mc:AlternateContent xmlns:mc="http://schemas.openxmlformats.org/markup-compatibility/2006">
+          <mc:Choice xmlns:a14="http://schemas.microsoft.com/office/drawing/2010/main" Requires="a14">
             <p:sp>
               <p:nvSpPr>
                 <p:cNvPr id="206" name="TextBox 205">
@@ -6220,7 +6220,7 @@
               </p:txBody>
             </p:sp>
           </mc:Choice>
-          <mc:Fallback xmlns="">
+          <mc:Fallback>
             <p:sp>
               <p:nvSpPr>
                 <p:cNvPr id="206" name="TextBox 205">
@@ -6265,8 +6265,8 @@
             </p:sp>
           </mc:Fallback>
         </mc:AlternateContent>
-        <mc:AlternateContent xmlns:mc="http://schemas.openxmlformats.org/markup-compatibility/2006" xmlns:a14="http://schemas.microsoft.com/office/drawing/2010/main">
-          <mc:Choice Requires="a14">
+        <mc:AlternateContent xmlns:mc="http://schemas.openxmlformats.org/markup-compatibility/2006">
+          <mc:Choice xmlns:a14="http://schemas.microsoft.com/office/drawing/2010/main" Requires="a14">
             <p:sp>
               <p:nvSpPr>
                 <p:cNvPr id="207" name="TextBox 206">
@@ -6335,7 +6335,7 @@
               </p:txBody>
             </p:sp>
           </mc:Choice>
-          <mc:Fallback xmlns="">
+          <mc:Fallback>
             <p:sp>
               <p:nvSpPr>
                 <p:cNvPr id="207" name="TextBox 206">
@@ -6380,8 +6380,8 @@
             </p:sp>
           </mc:Fallback>
         </mc:AlternateContent>
-        <mc:AlternateContent xmlns:mc="http://schemas.openxmlformats.org/markup-compatibility/2006" xmlns:a14="http://schemas.microsoft.com/office/drawing/2010/main">
-          <mc:Choice Requires="a14">
+        <mc:AlternateContent xmlns:mc="http://schemas.openxmlformats.org/markup-compatibility/2006">
+          <mc:Choice xmlns:a14="http://schemas.microsoft.com/office/drawing/2010/main" Requires="a14">
             <p:sp>
               <p:nvSpPr>
                 <p:cNvPr id="208" name="TextBox 207">
@@ -6456,7 +6456,7 @@
               </p:txBody>
             </p:sp>
           </mc:Choice>
-          <mc:Fallback xmlns="">
+          <mc:Fallback>
             <p:sp>
               <p:nvSpPr>
                 <p:cNvPr id="208" name="TextBox 207">
@@ -6501,8 +6501,8 @@
             </p:sp>
           </mc:Fallback>
         </mc:AlternateContent>
-        <mc:AlternateContent xmlns:mc="http://schemas.openxmlformats.org/markup-compatibility/2006" xmlns:a14="http://schemas.microsoft.com/office/drawing/2010/main">
-          <mc:Choice Requires="a14">
+        <mc:AlternateContent xmlns:mc="http://schemas.openxmlformats.org/markup-compatibility/2006">
+          <mc:Choice xmlns:a14="http://schemas.microsoft.com/office/drawing/2010/main" Requires="a14">
             <p:sp>
               <p:nvSpPr>
                 <p:cNvPr id="209" name="TextBox 208">
@@ -6577,7 +6577,7 @@
               </p:txBody>
             </p:sp>
           </mc:Choice>
-          <mc:Fallback xmlns="">
+          <mc:Fallback>
             <p:sp>
               <p:nvSpPr>
                 <p:cNvPr id="209" name="TextBox 208">
@@ -6622,8 +6622,8 @@
             </p:sp>
           </mc:Fallback>
         </mc:AlternateContent>
-        <mc:AlternateContent xmlns:mc="http://schemas.openxmlformats.org/markup-compatibility/2006" xmlns:a14="http://schemas.microsoft.com/office/drawing/2010/main">
-          <mc:Choice Requires="a14">
+        <mc:AlternateContent xmlns:mc="http://schemas.openxmlformats.org/markup-compatibility/2006">
+          <mc:Choice xmlns:a14="http://schemas.microsoft.com/office/drawing/2010/main" Requires="a14">
             <p:sp>
               <p:nvSpPr>
                 <p:cNvPr id="210" name="TextBox 209">
@@ -6704,7 +6704,7 @@
               </p:txBody>
             </p:sp>
           </mc:Choice>
-          <mc:Fallback xmlns="">
+          <mc:Fallback>
             <p:sp>
               <p:nvSpPr>
                 <p:cNvPr id="210" name="TextBox 209">
@@ -6749,8 +6749,8 @@
             </p:sp>
           </mc:Fallback>
         </mc:AlternateContent>
-        <mc:AlternateContent xmlns:mc="http://schemas.openxmlformats.org/markup-compatibility/2006" xmlns:a14="http://schemas.microsoft.com/office/drawing/2010/main">
-          <mc:Choice Requires="a14">
+        <mc:AlternateContent xmlns:mc="http://schemas.openxmlformats.org/markup-compatibility/2006">
+          <mc:Choice xmlns:a14="http://schemas.microsoft.com/office/drawing/2010/main" Requires="a14">
             <p:sp>
               <p:nvSpPr>
                 <p:cNvPr id="211" name="TextBox 210">
@@ -6819,7 +6819,7 @@
               </p:txBody>
             </p:sp>
           </mc:Choice>
-          <mc:Fallback xmlns="">
+          <mc:Fallback>
             <p:sp>
               <p:nvSpPr>
                 <p:cNvPr id="211" name="TextBox 210">
@@ -6864,8 +6864,8 @@
             </p:sp>
           </mc:Fallback>
         </mc:AlternateContent>
-        <mc:AlternateContent xmlns:mc="http://schemas.openxmlformats.org/markup-compatibility/2006" xmlns:a14="http://schemas.microsoft.com/office/drawing/2010/main">
-          <mc:Choice Requires="a14">
+        <mc:AlternateContent xmlns:mc="http://schemas.openxmlformats.org/markup-compatibility/2006">
+          <mc:Choice xmlns:a14="http://schemas.microsoft.com/office/drawing/2010/main" Requires="a14">
             <p:sp>
               <p:nvSpPr>
                 <p:cNvPr id="212" name="TextBox 211">
@@ -6940,7 +6940,7 @@
               </p:txBody>
             </p:sp>
           </mc:Choice>
-          <mc:Fallback xmlns="">
+          <mc:Fallback>
             <p:sp>
               <p:nvSpPr>
                 <p:cNvPr id="212" name="TextBox 211">
@@ -6985,8 +6985,8 @@
             </p:sp>
           </mc:Fallback>
         </mc:AlternateContent>
-        <mc:AlternateContent xmlns:mc="http://schemas.openxmlformats.org/markup-compatibility/2006" xmlns:a14="http://schemas.microsoft.com/office/drawing/2010/main">
-          <mc:Choice Requires="a14">
+        <mc:AlternateContent xmlns:mc="http://schemas.openxmlformats.org/markup-compatibility/2006">
+          <mc:Choice xmlns:a14="http://schemas.microsoft.com/office/drawing/2010/main" Requires="a14">
             <p:sp>
               <p:nvSpPr>
                 <p:cNvPr id="213" name="TextBox 212">
@@ -7067,7 +7067,7 @@
               </p:txBody>
             </p:sp>
           </mc:Choice>
-          <mc:Fallback xmlns="">
+          <mc:Fallback>
             <p:sp>
               <p:nvSpPr>
                 <p:cNvPr id="213" name="TextBox 212">
@@ -7129,7 +7129,7 @@
               <p:spPr>
                 <a:xfrm>
                   <a:off x="-2095540" y="3184394"/>
-                  <a:ext cx="463525" cy="492443"/>
+                  <a:ext cx="466281" cy="492443"/>
                 </a:xfrm>
                 <a:prstGeom prst="rect">
                   <a:avLst/>
@@ -7162,7 +7162,7 @@
                               <a:rPr lang="en-US" sz="3200" b="0" i="1" smtClean="0">
                                 <a:latin typeface="Cambria Math" panose="02040503050406030204" pitchFamily="18" charset="0"/>
                               </a:rPr>
-                              <m:t>𝑥</m:t>
+                              <m:t>𝑦</m:t>
                             </m:r>
                           </m:e>
                           <m:sub>
@@ -7200,7 +7200,7 @@
               <p:spPr>
                 <a:xfrm>
                   <a:off x="-2095540" y="3184394"/>
-                  <a:ext cx="463525" cy="492443"/>
+                  <a:ext cx="466281" cy="492443"/>
                 </a:xfrm>
                 <a:prstGeom prst="rect">
                   <a:avLst/>
@@ -7208,7 +7208,7 @@
                 <a:blipFill>
                   <a:blip r:embed="rId15"/>
                   <a:stretch>
-                    <a:fillRect l="-7895" r="-5263" b="-17500"/>
+                    <a:fillRect/>
                   </a:stretch>
                 </a:blipFill>
               </p:spPr>
@@ -7217,7 +7217,7 @@
                 <a:lstStyle/>
                 <a:p>
                   <a:r>
-                    <a:rPr lang="en-NL">
+                    <a:rPr lang="en-US">
                       <a:noFill/>
                     </a:rPr>
                     <a:t> </a:t>
@@ -7227,8 +7227,8 @@
             </p:sp>
           </mc:Fallback>
         </mc:AlternateContent>
-        <mc:AlternateContent xmlns:mc="http://schemas.openxmlformats.org/markup-compatibility/2006" xmlns:a14="http://schemas.microsoft.com/office/drawing/2010/main">
-          <mc:Choice Requires="a14">
+        <mc:AlternateContent xmlns:mc="http://schemas.openxmlformats.org/markup-compatibility/2006">
+          <mc:Choice xmlns:a14="http://schemas.microsoft.com/office/drawing/2010/main" Requires="a14">
             <p:sp>
               <p:nvSpPr>
                 <p:cNvPr id="215" name="TextBox 214">
@@ -7297,7 +7297,7 @@
               </p:txBody>
             </p:sp>
           </mc:Choice>
-          <mc:Fallback xmlns="">
+          <mc:Fallback>
             <p:sp>
               <p:nvSpPr>
                 <p:cNvPr id="215" name="TextBox 214">

</xml_diff>